<commit_message>
add segmentation to ppt
</commit_message>
<xml_diff>
--- a/presentation/eecs442_final_presentation.pptx
+++ b/presentation/eecs442_final_presentation.pptx
@@ -3531,11 +3531,7 @@
             </a:r>
             <a:r>
               <a:rPr lang="en-US" sz="2800" dirty="0" smtClean="0"/>
-              <a:t>, </a:t>
-            </a:r>
-            <a:r>
-              <a:rPr lang="en-US" sz="2800" dirty="0" smtClean="0"/>
-              <a:t>2017</a:t>
+              <a:t>, 2017</a:t>
             </a:r>
           </a:p>
           <a:p>
@@ -4472,11 +4468,7 @@
           <a:p>
             <a:r>
               <a:rPr kumimoji="1" lang="en-US" altLang="zh-CN" sz="4000" smtClean="0"/>
-              <a:t>Introduction</a:t>
-            </a:r>
-            <a:r>
-              <a:rPr kumimoji="1" lang="en-US" altLang="zh-CN" sz="4000" smtClean="0"/>
-              <a:t>:</a:t>
+              <a:t>Introduction:</a:t>
             </a:r>
             <a:r>
               <a:rPr kumimoji="1" lang="zh-CN" altLang="en-US" sz="4000" smtClean="0"/>
@@ -4991,47 +4983,47 @@
           <a:lstStyle/>
           <a:p>
             <a:r>
-              <a:rPr lang="en-US" altLang="zh-CN" b="1" smtClean="0"/>
+              <a:rPr lang="en-US" altLang="zh-CN" b="1" dirty="0" smtClean="0"/>
               <a:t>Edge</a:t>
             </a:r>
             <a:r>
-              <a:rPr lang="zh-CN" altLang="en-US" b="1" smtClean="0"/>
-              <a:t> </a:t>
-            </a:r>
-            <a:r>
-              <a:rPr lang="en-US" altLang="zh-CN" b="1" smtClean="0"/>
+              <a:rPr lang="zh-CN" altLang="en-US" b="1" dirty="0" smtClean="0"/>
+              <a:t> </a:t>
+            </a:r>
+            <a:r>
+              <a:rPr lang="en-US" altLang="zh-CN" b="1" dirty="0" smtClean="0"/>
               <a:t>detection</a:t>
             </a:r>
             <a:r>
-              <a:rPr lang="zh-CN" altLang="en-US" b="1" smtClean="0"/>
-              <a:t> </a:t>
-            </a:r>
-            <a:r>
-              <a:rPr lang="en-US" altLang="zh-CN" b="1" smtClean="0"/>
+              <a:rPr lang="zh-CN" altLang="en-US" b="1" dirty="0" smtClean="0"/>
+              <a:t> </a:t>
+            </a:r>
+            <a:r>
+              <a:rPr lang="en-US" altLang="zh-CN" b="1" dirty="0" smtClean="0"/>
               <a:t>to</a:t>
             </a:r>
             <a:r>
-              <a:rPr lang="zh-CN" altLang="en-US" b="1" smtClean="0"/>
-              <a:t> </a:t>
-            </a:r>
-            <a:r>
-              <a:rPr lang="en-US" altLang="zh-CN" b="1" smtClean="0"/>
+              <a:rPr lang="zh-CN" altLang="en-US" b="1" dirty="0" smtClean="0"/>
+              <a:t> </a:t>
+            </a:r>
+            <a:r>
+              <a:rPr lang="en-US" altLang="zh-CN" b="1" dirty="0" smtClean="0"/>
               <a:t>remove</a:t>
             </a:r>
             <a:r>
-              <a:rPr lang="zh-CN" altLang="en-US" b="1" smtClean="0"/>
-              <a:t> </a:t>
-            </a:r>
-            <a:r>
-              <a:rPr lang="en-US" altLang="zh-CN" b="1" smtClean="0"/>
+              <a:rPr lang="zh-CN" altLang="en-US" b="1" dirty="0" smtClean="0"/>
+              <a:t> </a:t>
+            </a:r>
+            <a:r>
+              <a:rPr lang="en-US" altLang="zh-CN" b="1" dirty="0" smtClean="0"/>
               <a:t>unnecessary</a:t>
             </a:r>
             <a:r>
-              <a:rPr lang="zh-CN" altLang="en-US" b="1" smtClean="0"/>
-              <a:t> </a:t>
-            </a:r>
-            <a:r>
-              <a:rPr lang="en-US" altLang="zh-CN" b="1" smtClean="0"/>
+              <a:rPr lang="zh-CN" altLang="en-US" b="1" dirty="0" smtClean="0"/>
+              <a:t> </a:t>
+            </a:r>
+            <a:r>
+              <a:rPr lang="en-US" altLang="zh-CN" b="1" dirty="0" smtClean="0"/>
               <a:t>information</a:t>
             </a:r>
           </a:p>
@@ -5041,54 +5033,54 @@
               <a:buChar char="q"/>
             </a:pPr>
             <a:r>
-              <a:rPr lang="zh-CN" altLang="en-US" b="1"/>
-              <a:t> </a:t>
-            </a:r>
-            <a:r>
-              <a:rPr lang="en-US" altLang="zh-CN" smtClean="0"/>
+              <a:rPr lang="zh-CN" altLang="en-US" b="1" dirty="0"/>
+              <a:t> </a:t>
+            </a:r>
+            <a:r>
+              <a:rPr lang="en-US" altLang="zh-CN" dirty="0" smtClean="0"/>
               <a:t>Apply</a:t>
             </a:r>
             <a:r>
-              <a:rPr lang="zh-CN" altLang="en-US" smtClean="0"/>
-              <a:t> </a:t>
-            </a:r>
-            <a:r>
-              <a:rPr lang="en-US" altLang="zh-CN" smtClean="0"/>
+              <a:rPr lang="zh-CN" altLang="en-US" dirty="0" smtClean="0"/>
+              <a:t> </a:t>
+            </a:r>
+            <a:r>
+              <a:rPr lang="en-US" altLang="zh-CN" dirty="0" smtClean="0"/>
               <a:t>two</a:t>
             </a:r>
             <a:r>
-              <a:rPr lang="zh-CN" altLang="en-US" smtClean="0"/>
-              <a:t> </a:t>
-            </a:r>
-            <a:r>
-              <a:rPr lang="en-US" altLang="zh-CN" smtClean="0"/>
+              <a:rPr lang="zh-CN" altLang="en-US" dirty="0" smtClean="0"/>
+              <a:t> </a:t>
+            </a:r>
+            <a:r>
+              <a:rPr lang="en-US" altLang="zh-CN" dirty="0" smtClean="0"/>
               <a:t>kernels</a:t>
             </a:r>
             <a:r>
-              <a:rPr lang="zh-CN" altLang="en-US" smtClean="0"/>
-              <a:t> </a:t>
-            </a:r>
-            <a:r>
-              <a:rPr lang="en-US" altLang="zh-CN" smtClean="0"/>
+              <a:rPr lang="zh-CN" altLang="en-US" dirty="0" smtClean="0"/>
+              <a:t> </a:t>
+            </a:r>
+            <a:r>
+              <a:rPr lang="en-US" altLang="zh-CN" dirty="0" smtClean="0"/>
               <a:t>horizontally</a:t>
             </a:r>
             <a:r>
-              <a:rPr lang="zh-CN" altLang="en-US" smtClean="0"/>
-              <a:t> </a:t>
-            </a:r>
-            <a:r>
-              <a:rPr lang="en-US" altLang="zh-CN" smtClean="0"/>
+              <a:rPr lang="zh-CN" altLang="en-US" dirty="0" smtClean="0"/>
+              <a:t> </a:t>
+            </a:r>
+            <a:r>
+              <a:rPr lang="en-US" altLang="zh-CN" dirty="0" smtClean="0"/>
               <a:t>and</a:t>
             </a:r>
             <a:r>
-              <a:rPr lang="zh-CN" altLang="en-US" smtClean="0"/>
-              <a:t> </a:t>
-            </a:r>
-            <a:r>
-              <a:rPr lang="en-US" altLang="zh-CN" smtClean="0"/>
+              <a:rPr lang="zh-CN" altLang="en-US" dirty="0" smtClean="0"/>
+              <a:t> </a:t>
+            </a:r>
+            <a:r>
+              <a:rPr lang="en-US" altLang="zh-CN" dirty="0" smtClean="0"/>
               <a:t>vertically</a:t>
             </a:r>
-            <a:endParaRPr lang="en-US" altLang="zh-CN"/>
+            <a:endParaRPr lang="en-US" altLang="zh-CN" dirty="0"/>
           </a:p>
           <a:p>
             <a:pPr>
@@ -5096,98 +5088,98 @@
               <a:buChar char="q"/>
             </a:pPr>
             <a:r>
-              <a:rPr lang="zh-CN" altLang="en-US" b="1" smtClean="0"/>
-              <a:t> </a:t>
-            </a:r>
-            <a:r>
-              <a:rPr lang="en-US" altLang="zh-CN" smtClean="0"/>
+              <a:rPr lang="zh-CN" altLang="en-US" b="1" dirty="0" smtClean="0"/>
+              <a:t> </a:t>
+            </a:r>
+            <a:r>
+              <a:rPr lang="en-US" altLang="zh-CN" dirty="0" smtClean="0"/>
               <a:t>Filter</a:t>
             </a:r>
             <a:r>
-              <a:rPr lang="zh-CN" altLang="en-US" smtClean="0"/>
-              <a:t> </a:t>
-            </a:r>
-            <a:r>
-              <a:rPr lang="en-US" altLang="zh-CN" smtClean="0"/>
+              <a:rPr lang="zh-CN" altLang="en-US" dirty="0" smtClean="0"/>
+              <a:t> </a:t>
+            </a:r>
+            <a:r>
+              <a:rPr lang="en-US" altLang="zh-CN" dirty="0" smtClean="0"/>
               <a:t>pixels</a:t>
             </a:r>
             <a:r>
-              <a:rPr lang="zh-CN" altLang="en-US" smtClean="0"/>
-              <a:t> </a:t>
-            </a:r>
-            <a:r>
-              <a:rPr lang="en-US" altLang="zh-CN" smtClean="0"/>
+              <a:rPr lang="zh-CN" altLang="en-US" dirty="0" smtClean="0"/>
+              <a:t> </a:t>
+            </a:r>
+            <a:r>
+              <a:rPr lang="en-US" altLang="zh-CN" dirty="0" smtClean="0"/>
               <a:t>by</a:t>
             </a:r>
             <a:r>
-              <a:rPr lang="zh-CN" altLang="en-US" smtClean="0"/>
-              <a:t> </a:t>
-            </a:r>
-            <a:r>
-              <a:rPr lang="en-US" altLang="zh-CN" smtClean="0"/>
+              <a:rPr lang="zh-CN" altLang="en-US" dirty="0" smtClean="0"/>
+              <a:t> </a:t>
+            </a:r>
+            <a:r>
+              <a:rPr lang="en-US" altLang="zh-CN" dirty="0" smtClean="0"/>
               <a:t>defining</a:t>
             </a:r>
             <a:r>
-              <a:rPr lang="zh-CN" altLang="en-US" smtClean="0"/>
-              <a:t> </a:t>
-            </a:r>
-            <a:r>
-              <a:rPr lang="en-US" altLang="zh-CN" smtClean="0"/>
+              <a:rPr lang="zh-CN" altLang="en-US" dirty="0" smtClean="0"/>
+              <a:t> </a:t>
+            </a:r>
+            <a:r>
+              <a:rPr lang="en-US" altLang="zh-CN" dirty="0" smtClean="0"/>
               <a:t>a</a:t>
             </a:r>
             <a:r>
-              <a:rPr lang="zh-CN" altLang="en-US" smtClean="0"/>
-              <a:t> </a:t>
-            </a:r>
-            <a:r>
-              <a:rPr lang="en-US" altLang="zh-CN" smtClean="0"/>
+              <a:rPr lang="zh-CN" altLang="en-US" dirty="0" smtClean="0"/>
+              <a:t> </a:t>
+            </a:r>
+            <a:r>
+              <a:rPr lang="en-US" altLang="zh-CN" dirty="0" smtClean="0"/>
               <a:t>threshold</a:t>
             </a:r>
-            <a:endParaRPr lang="en-US" altLang="zh-CN" b="1" smtClean="0"/>
-          </a:p>
-          <a:p>
-            <a:r>
-              <a:rPr lang="en-US" altLang="zh-CN" b="1" smtClean="0"/>
+            <a:endParaRPr lang="en-US" altLang="zh-CN" b="1" dirty="0" smtClean="0"/>
+          </a:p>
+          <a:p>
+            <a:r>
+              <a:rPr lang="en-US" altLang="zh-CN" b="1" dirty="0" smtClean="0"/>
               <a:t>Calculate</a:t>
             </a:r>
             <a:r>
-              <a:rPr lang="zh-CN" altLang="en-US" b="1" smtClean="0"/>
-              <a:t> </a:t>
-            </a:r>
-            <a:r>
-              <a:rPr lang="en-US" altLang="zh-CN" b="1" smtClean="0"/>
+              <a:rPr lang="zh-CN" altLang="en-US" b="1" dirty="0" smtClean="0"/>
+              <a:t> </a:t>
+            </a:r>
+            <a:r>
+              <a:rPr lang="en-US" altLang="zh-CN" b="1" dirty="0" smtClean="0"/>
               <a:t>histogram</a:t>
             </a:r>
             <a:r>
-              <a:rPr lang="zh-CN" altLang="en-US" b="1" smtClean="0"/>
-              <a:t> </a:t>
-            </a:r>
-            <a:r>
-              <a:rPr lang="en-US" altLang="zh-CN" b="1" smtClean="0"/>
+              <a:rPr lang="zh-CN" altLang="en-US" b="1" dirty="0" smtClean="0"/>
+              <a:t> </a:t>
+            </a:r>
+            <a:r>
+              <a:rPr lang="en-US" altLang="zh-CN" b="1" dirty="0" smtClean="0"/>
               <a:t>to</a:t>
             </a:r>
             <a:r>
-              <a:rPr lang="zh-CN" altLang="en-US" b="1" smtClean="0"/>
-              <a:t> </a:t>
-            </a:r>
-            <a:r>
-              <a:rPr lang="en-US" altLang="zh-CN" b="1" smtClean="0"/>
+              <a:rPr lang="zh-CN" altLang="en-US" b="1" dirty="0" smtClean="0"/>
+              <a:t> </a:t>
+            </a:r>
+            <a:r>
+              <a:rPr lang="en-US" altLang="zh-CN" b="1" dirty="0" smtClean="0"/>
               <a:t>extract</a:t>
             </a:r>
             <a:r>
-              <a:rPr lang="zh-CN" altLang="en-US" b="1" smtClean="0"/>
-              <a:t> </a:t>
-            </a:r>
-            <a:r>
-              <a:rPr lang="en-US" altLang="zh-CN" b="1" smtClean="0"/>
+              <a:rPr lang="zh-CN" altLang="en-US" b="1" dirty="0" smtClean="0"/>
+              <a:t> </a:t>
+            </a:r>
+            <a:r>
+              <a:rPr lang="en-US" altLang="zh-CN" b="1" dirty="0" smtClean="0"/>
               <a:t>the</a:t>
             </a:r>
             <a:r>
-              <a:rPr lang="zh-CN" altLang="en-US" b="1" smtClean="0"/>
-              <a:t> </a:t>
-            </a:r>
-            <a:r>
-              <a:rPr lang="en-US" altLang="zh-CN" b="1" smtClean="0"/>
+              <a:rPr lang="zh-CN" altLang="en-US" b="1" dirty="0" smtClean="0"/>
+              <a:t> </a:t>
+            </a:r>
+            <a:r>
+              <a:rPr lang="en-US" altLang="zh-CN" b="1" dirty="0" smtClean="0"/>
               <a:t>plate</a:t>
             </a:r>
           </a:p>
@@ -5197,43 +5189,43 @@
               <a:buChar char="q"/>
             </a:pPr>
             <a:r>
-              <a:rPr lang="zh-CN" altLang="en-US"/>
-              <a:t> </a:t>
-            </a:r>
-            <a:r>
-              <a:rPr lang="en-US" altLang="zh-CN" smtClean="0"/>
+              <a:rPr lang="zh-CN" altLang="en-US" dirty="0"/>
+              <a:t> </a:t>
+            </a:r>
+            <a:r>
+              <a:rPr lang="en-US" altLang="zh-CN" dirty="0" smtClean="0"/>
               <a:t>Calculate</a:t>
             </a:r>
             <a:r>
-              <a:rPr lang="zh-CN" altLang="en-US" smtClean="0"/>
-              <a:t> </a:t>
-            </a:r>
-            <a:r>
-              <a:rPr lang="en-US" altLang="zh-CN" smtClean="0"/>
+              <a:rPr lang="zh-CN" altLang="en-US" dirty="0" smtClean="0"/>
+              <a:t> </a:t>
+            </a:r>
+            <a:r>
+              <a:rPr lang="en-US" altLang="zh-CN" dirty="0" smtClean="0"/>
               <a:t>column-wise</a:t>
             </a:r>
             <a:r>
-              <a:rPr lang="zh-CN" altLang="en-US" smtClean="0"/>
-              <a:t> </a:t>
-            </a:r>
-            <a:r>
-              <a:rPr lang="en-US" altLang="zh-CN" smtClean="0"/>
+              <a:rPr lang="zh-CN" altLang="en-US" dirty="0" smtClean="0"/>
+              <a:t> </a:t>
+            </a:r>
+            <a:r>
+              <a:rPr lang="en-US" altLang="zh-CN" dirty="0" smtClean="0"/>
               <a:t>and</a:t>
             </a:r>
             <a:r>
-              <a:rPr lang="zh-CN" altLang="en-US" smtClean="0"/>
-              <a:t> </a:t>
-            </a:r>
-            <a:r>
-              <a:rPr lang="en-US" altLang="zh-CN" smtClean="0"/>
+              <a:rPr lang="zh-CN" altLang="en-US" dirty="0" smtClean="0"/>
+              <a:t> </a:t>
+            </a:r>
+            <a:r>
+              <a:rPr lang="en-US" altLang="zh-CN" dirty="0" smtClean="0"/>
               <a:t>row-wise</a:t>
             </a:r>
             <a:r>
-              <a:rPr lang="zh-CN" altLang="en-US" smtClean="0"/>
-              <a:t> </a:t>
-            </a:r>
-            <a:r>
-              <a:rPr lang="en-US" altLang="zh-CN" smtClean="0"/>
+              <a:rPr lang="zh-CN" altLang="en-US" dirty="0" smtClean="0"/>
+              <a:t> </a:t>
+            </a:r>
+            <a:r>
+              <a:rPr lang="en-US" altLang="zh-CN" dirty="0" smtClean="0"/>
               <a:t>difference</a:t>
             </a:r>
           </a:p>
@@ -5243,75 +5235,75 @@
               <a:buChar char="q"/>
             </a:pPr>
             <a:r>
-              <a:rPr lang="zh-CN" altLang="en-US"/>
-              <a:t> </a:t>
-            </a:r>
-            <a:r>
-              <a:rPr lang="en-US" altLang="zh-CN" smtClean="0"/>
+              <a:rPr lang="zh-CN" altLang="en-US" dirty="0"/>
+              <a:t> </a:t>
+            </a:r>
+            <a:r>
+              <a:rPr lang="en-US" altLang="zh-CN" dirty="0" smtClean="0"/>
               <a:t>Calculate</a:t>
             </a:r>
             <a:r>
-              <a:rPr lang="zh-CN" altLang="en-US" smtClean="0"/>
-              <a:t> </a:t>
-            </a:r>
-            <a:r>
-              <a:rPr lang="en-US" altLang="zh-CN" smtClean="0"/>
+              <a:rPr lang="zh-CN" altLang="en-US" dirty="0" smtClean="0"/>
+              <a:t> </a:t>
+            </a:r>
+            <a:r>
+              <a:rPr lang="en-US" altLang="zh-CN" dirty="0" smtClean="0"/>
               <a:t>horizontal</a:t>
             </a:r>
             <a:r>
-              <a:rPr lang="zh-CN" altLang="en-US" smtClean="0"/>
-              <a:t> </a:t>
-            </a:r>
-            <a:r>
-              <a:rPr lang="en-US" altLang="zh-CN" smtClean="0"/>
+              <a:rPr lang="zh-CN" altLang="en-US" dirty="0" smtClean="0"/>
+              <a:t> </a:t>
+            </a:r>
+            <a:r>
+              <a:rPr lang="en-US" altLang="zh-CN" dirty="0" smtClean="0"/>
               <a:t>and</a:t>
             </a:r>
             <a:r>
-              <a:rPr lang="zh-CN" altLang="en-US" smtClean="0"/>
-              <a:t> </a:t>
-            </a:r>
-            <a:r>
-              <a:rPr lang="en-US" altLang="zh-CN" smtClean="0"/>
+              <a:rPr lang="zh-CN" altLang="en-US" dirty="0" smtClean="0"/>
+              <a:t> </a:t>
+            </a:r>
+            <a:r>
+              <a:rPr lang="en-US" altLang="zh-CN" dirty="0" smtClean="0"/>
               <a:t>vertical</a:t>
             </a:r>
             <a:r>
-              <a:rPr lang="zh-CN" altLang="en-US" smtClean="0"/>
-              <a:t> </a:t>
-            </a:r>
-            <a:r>
-              <a:rPr lang="en-US" altLang="zh-CN" smtClean="0"/>
+              <a:rPr lang="zh-CN" altLang="en-US" dirty="0" smtClean="0"/>
+              <a:t> </a:t>
+            </a:r>
+            <a:r>
+              <a:rPr lang="en-US" altLang="zh-CN" dirty="0" smtClean="0"/>
               <a:t>histogram</a:t>
             </a:r>
             <a:r>
-              <a:rPr lang="zh-CN" altLang="en-US" smtClean="0"/>
-              <a:t> </a:t>
-            </a:r>
-            <a:r>
-              <a:rPr lang="en-US" altLang="zh-CN" smtClean="0"/>
+              <a:rPr lang="zh-CN" altLang="en-US" dirty="0" smtClean="0"/>
+              <a:t> </a:t>
+            </a:r>
+            <a:r>
+              <a:rPr lang="en-US" altLang="zh-CN" dirty="0" smtClean="0"/>
               <a:t>by</a:t>
             </a:r>
             <a:r>
-              <a:rPr lang="zh-CN" altLang="en-US" smtClean="0"/>
-              <a:t> </a:t>
-            </a:r>
-            <a:r>
-              <a:rPr lang="en-US" altLang="zh-CN" smtClean="0"/>
+              <a:rPr lang="zh-CN" altLang="en-US" dirty="0" smtClean="0"/>
+              <a:t> </a:t>
+            </a:r>
+            <a:r>
+              <a:rPr lang="en-US" altLang="zh-CN" dirty="0" smtClean="0"/>
               <a:t>defining</a:t>
             </a:r>
             <a:r>
-              <a:rPr lang="zh-CN" altLang="en-US" smtClean="0"/>
-              <a:t> </a:t>
-            </a:r>
-            <a:r>
-              <a:rPr lang="en-US" altLang="zh-CN" smtClean="0"/>
+              <a:rPr lang="zh-CN" altLang="en-US" dirty="0" smtClean="0"/>
+              <a:t> </a:t>
+            </a:r>
+            <a:r>
+              <a:rPr lang="en-US" altLang="zh-CN" dirty="0" smtClean="0"/>
               <a:t>a</a:t>
             </a:r>
             <a:r>
-              <a:rPr lang="zh-CN" altLang="en-US" smtClean="0"/>
-              <a:t> </a:t>
-            </a:r>
-            <a:r>
-              <a:rPr lang="en-US" altLang="zh-CN" smtClean="0"/>
+              <a:rPr lang="zh-CN" altLang="en-US" dirty="0" smtClean="0"/>
+              <a:t> </a:t>
+            </a:r>
+            <a:r>
+              <a:rPr lang="en-US" altLang="zh-CN" dirty="0" smtClean="0"/>
               <a:t>threshold</a:t>
             </a:r>
           </a:p>
@@ -5321,91 +5313,91 @@
               <a:buChar char="q"/>
             </a:pPr>
             <a:r>
-              <a:rPr lang="zh-CN" altLang="en-US"/>
-              <a:t> </a:t>
-            </a:r>
-            <a:r>
-              <a:rPr lang="en-US" altLang="zh-CN" smtClean="0"/>
+              <a:rPr lang="zh-CN" altLang="en-US" dirty="0"/>
+              <a:t> </a:t>
+            </a:r>
+            <a:r>
+              <a:rPr lang="en-US" altLang="zh-CN" dirty="0" smtClean="0"/>
               <a:t>Traverse</a:t>
             </a:r>
             <a:r>
-              <a:rPr lang="zh-CN" altLang="en-US" smtClean="0"/>
-              <a:t> </a:t>
-            </a:r>
-            <a:r>
-              <a:rPr lang="en-US" altLang="zh-CN" smtClean="0"/>
+              <a:rPr lang="zh-CN" altLang="en-US" dirty="0" smtClean="0"/>
+              <a:t> </a:t>
+            </a:r>
+            <a:r>
+              <a:rPr lang="en-US" altLang="zh-CN" dirty="0" smtClean="0"/>
               <a:t>histogram</a:t>
             </a:r>
             <a:r>
-              <a:rPr lang="zh-CN" altLang="en-US" smtClean="0"/>
-              <a:t> </a:t>
-            </a:r>
-            <a:r>
-              <a:rPr lang="en-US" altLang="zh-CN" smtClean="0"/>
+              <a:rPr lang="zh-CN" altLang="en-US" dirty="0" smtClean="0"/>
+              <a:t> </a:t>
+            </a:r>
+            <a:r>
+              <a:rPr lang="en-US" altLang="zh-CN" dirty="0" smtClean="0"/>
               <a:t>to</a:t>
             </a:r>
             <a:r>
-              <a:rPr lang="zh-CN" altLang="en-US" smtClean="0"/>
-              <a:t> </a:t>
-            </a:r>
-            <a:r>
-              <a:rPr lang="en-US" altLang="zh-CN" smtClean="0"/>
+              <a:rPr lang="zh-CN" altLang="en-US" dirty="0" smtClean="0"/>
+              <a:t> </a:t>
+            </a:r>
+            <a:r>
+              <a:rPr lang="en-US" altLang="zh-CN" dirty="0" smtClean="0"/>
               <a:t>get</a:t>
             </a:r>
             <a:r>
-              <a:rPr lang="zh-CN" altLang="en-US" smtClean="0"/>
-              <a:t> </a:t>
-            </a:r>
-            <a:r>
-              <a:rPr lang="en-US" altLang="zh-CN" smtClean="0"/>
+              <a:rPr lang="zh-CN" altLang="en-US" dirty="0" smtClean="0"/>
+              <a:t> </a:t>
+            </a:r>
+            <a:r>
+              <a:rPr lang="en-US" altLang="zh-CN" dirty="0" smtClean="0"/>
               <a:t>pairs</a:t>
             </a:r>
             <a:r>
-              <a:rPr lang="zh-CN" altLang="en-US" smtClean="0"/>
-              <a:t> </a:t>
-            </a:r>
-            <a:r>
-              <a:rPr lang="en-US" altLang="zh-CN" smtClean="0"/>
+              <a:rPr lang="zh-CN" altLang="en-US" dirty="0" smtClean="0"/>
+              <a:t> </a:t>
+            </a:r>
+            <a:r>
+              <a:rPr lang="en-US" altLang="zh-CN" dirty="0" smtClean="0"/>
               <a:t>of</a:t>
             </a:r>
             <a:r>
-              <a:rPr lang="zh-CN" altLang="en-US" smtClean="0"/>
-              <a:t> </a:t>
-            </a:r>
-            <a:r>
-              <a:rPr lang="en-US" altLang="zh-CN" smtClean="0"/>
+              <a:rPr lang="zh-CN" altLang="en-US" dirty="0" smtClean="0"/>
+              <a:t> </a:t>
+            </a:r>
+            <a:r>
+              <a:rPr lang="en-US" altLang="zh-CN" dirty="0" smtClean="0"/>
               <a:t>starting</a:t>
             </a:r>
             <a:r>
-              <a:rPr lang="zh-CN" altLang="en-US" smtClean="0"/>
-              <a:t> </a:t>
-            </a:r>
-            <a:r>
-              <a:rPr lang="en-US" altLang="zh-CN" smtClean="0"/>
+              <a:rPr lang="zh-CN" altLang="en-US" dirty="0" smtClean="0"/>
+              <a:t> </a:t>
+            </a:r>
+            <a:r>
+              <a:rPr lang="en-US" altLang="zh-CN" dirty="0" smtClean="0"/>
               <a:t>points</a:t>
             </a:r>
             <a:r>
-              <a:rPr lang="zh-CN" altLang="en-US" smtClean="0"/>
-              <a:t> </a:t>
-            </a:r>
-            <a:r>
-              <a:rPr lang="en-US" altLang="zh-CN" smtClean="0"/>
+              <a:rPr lang="zh-CN" altLang="en-US" dirty="0" smtClean="0"/>
+              <a:t> </a:t>
+            </a:r>
+            <a:r>
+              <a:rPr lang="en-US" altLang="zh-CN" dirty="0" smtClean="0"/>
               <a:t>and</a:t>
             </a:r>
             <a:r>
-              <a:rPr lang="zh-CN" altLang="en-US" smtClean="0"/>
-              <a:t> </a:t>
-            </a:r>
-            <a:r>
-              <a:rPr lang="en-US" altLang="zh-CN" smtClean="0"/>
+              <a:rPr lang="zh-CN" altLang="en-US" dirty="0" smtClean="0"/>
+              <a:t> </a:t>
+            </a:r>
+            <a:r>
+              <a:rPr lang="en-US" altLang="zh-CN" dirty="0" smtClean="0"/>
               <a:t>ending</a:t>
             </a:r>
             <a:r>
-              <a:rPr lang="zh-CN" altLang="en-US" smtClean="0"/>
-              <a:t> </a:t>
-            </a:r>
-            <a:r>
-              <a:rPr lang="en-US" altLang="zh-CN" smtClean="0"/>
+              <a:rPr lang="zh-CN" altLang="en-US" dirty="0" smtClean="0"/>
+              <a:t> </a:t>
+            </a:r>
+            <a:r>
+              <a:rPr lang="en-US" altLang="zh-CN" dirty="0" smtClean="0"/>
               <a:t>points</a:t>
             </a:r>
           </a:p>
@@ -5415,82 +5407,82 @@
               <a:buChar char="q"/>
             </a:pPr>
             <a:r>
-              <a:rPr lang="zh-CN" altLang="en-US"/>
-              <a:t> </a:t>
-            </a:r>
-            <a:r>
-              <a:rPr lang="en-US" altLang="zh-CN" smtClean="0"/>
+              <a:rPr lang="zh-CN" altLang="en-US" dirty="0"/>
+              <a:t> </a:t>
+            </a:r>
+            <a:r>
+              <a:rPr lang="en-US" altLang="zh-CN" dirty="0" smtClean="0"/>
               <a:t>Choose</a:t>
             </a:r>
             <a:r>
-              <a:rPr lang="zh-CN" altLang="en-US" smtClean="0"/>
-              <a:t> </a:t>
-            </a:r>
-            <a:r>
-              <a:rPr lang="en-US" altLang="zh-CN" smtClean="0"/>
+              <a:rPr lang="zh-CN" altLang="en-US" dirty="0" smtClean="0"/>
+              <a:t> </a:t>
+            </a:r>
+            <a:r>
+              <a:rPr lang="en-US" altLang="zh-CN" dirty="0" smtClean="0"/>
               <a:t>start</a:t>
             </a:r>
             <a:r>
-              <a:rPr lang="zh-CN" altLang="en-US" smtClean="0"/>
-              <a:t> </a:t>
-            </a:r>
-            <a:r>
-              <a:rPr lang="en-US" altLang="zh-CN" smtClean="0"/>
+              <a:rPr lang="zh-CN" altLang="en-US" dirty="0" smtClean="0"/>
+              <a:t> </a:t>
+            </a:r>
+            <a:r>
+              <a:rPr lang="en-US" altLang="zh-CN" dirty="0" smtClean="0"/>
               <a:t>and</a:t>
             </a:r>
             <a:r>
-              <a:rPr lang="zh-CN" altLang="en-US" smtClean="0"/>
-              <a:t> </a:t>
-            </a:r>
-            <a:r>
-              <a:rPr lang="en-US" altLang="zh-CN" smtClean="0"/>
+              <a:rPr lang="zh-CN" altLang="en-US" dirty="0" smtClean="0"/>
+              <a:t> </a:t>
+            </a:r>
+            <a:r>
+              <a:rPr lang="en-US" altLang="zh-CN" dirty="0" smtClean="0"/>
               <a:t>end</a:t>
             </a:r>
             <a:r>
-              <a:rPr lang="zh-CN" altLang="en-US" smtClean="0"/>
-              <a:t> </a:t>
-            </a:r>
-            <a:r>
-              <a:rPr lang="en-US" altLang="zh-CN" smtClean="0"/>
+              <a:rPr lang="zh-CN" altLang="en-US" dirty="0" smtClean="0"/>
+              <a:t> </a:t>
+            </a:r>
+            <a:r>
+              <a:rPr lang="en-US" altLang="zh-CN" dirty="0" smtClean="0"/>
               <a:t>points</a:t>
             </a:r>
             <a:r>
-              <a:rPr lang="zh-CN" altLang="en-US" smtClean="0"/>
-              <a:t> </a:t>
-            </a:r>
-            <a:r>
-              <a:rPr lang="en-US" altLang="zh-CN" smtClean="0"/>
+              <a:rPr lang="zh-CN" altLang="en-US" dirty="0" smtClean="0"/>
+              <a:t> </a:t>
+            </a:r>
+            <a:r>
+              <a:rPr lang="en-US" altLang="zh-CN" dirty="0" smtClean="0"/>
               <a:t>with</a:t>
             </a:r>
             <a:r>
-              <a:rPr lang="zh-CN" altLang="en-US" smtClean="0"/>
-              <a:t> </a:t>
-            </a:r>
-            <a:r>
-              <a:rPr lang="en-US" altLang="zh-CN" smtClean="0"/>
+              <a:rPr lang="zh-CN" altLang="en-US" dirty="0" smtClean="0"/>
+              <a:t> </a:t>
+            </a:r>
+            <a:r>
+              <a:rPr lang="en-US" altLang="zh-CN" dirty="0" smtClean="0"/>
               <a:t>largest</a:t>
             </a:r>
             <a:r>
-              <a:rPr lang="zh-CN" altLang="en-US" smtClean="0"/>
-              <a:t> </a:t>
-            </a:r>
-            <a:r>
-              <a:rPr lang="en-US" altLang="zh-CN" smtClean="0"/>
+              <a:rPr lang="zh-CN" altLang="en-US" dirty="0" smtClean="0"/>
+              <a:t> </a:t>
+            </a:r>
+            <a:r>
+              <a:rPr lang="en-US" altLang="zh-CN" dirty="0" smtClean="0"/>
               <a:t>difference</a:t>
             </a:r>
             <a:r>
-              <a:rPr lang="zh-CN" altLang="en-US" smtClean="0"/>
-              <a:t> </a:t>
-            </a:r>
-            <a:r>
-              <a:rPr lang="en-US" altLang="zh-CN" smtClean="0"/>
+              <a:rPr lang="zh-CN" altLang="en-US" dirty="0" smtClean="0"/>
+              <a:t> </a:t>
+            </a:r>
+            <a:r>
+              <a:rPr lang="en-US" altLang="zh-CN" dirty="0" smtClean="0"/>
               <a:t>(length)</a:t>
             </a:r>
             <a:r>
-              <a:rPr lang="zh-CN" altLang="en-US" smtClean="0"/>
-              <a:t> </a:t>
-            </a:r>
-            <a:endParaRPr lang="en-US"/>
+              <a:rPr lang="zh-CN" altLang="en-US" dirty="0" smtClean="0"/>
+              <a:t> </a:t>
+            </a:r>
+            <a:endParaRPr lang="en-US" dirty="0"/>
           </a:p>
         </p:txBody>
       </p:sp>
@@ -5588,10 +5580,155 @@
           </a:xfrm>
         </p:spPr>
         <p:txBody>
-          <a:bodyPr/>
+          <a:bodyPr>
+            <a:normAutofit/>
+          </a:bodyPr>
           <a:lstStyle/>
           <a:p>
-            <a:endParaRPr lang="en-US"/>
+            <a:r>
+              <a:rPr lang="en-US" altLang="zh-CN" b="1" dirty="0" smtClean="0"/>
+              <a:t>Calculate</a:t>
+            </a:r>
+            <a:r>
+              <a:rPr lang="zh-CN" altLang="en-US" b="1" dirty="0" smtClean="0"/>
+              <a:t> </a:t>
+            </a:r>
+            <a:r>
+              <a:rPr lang="en-US" altLang="zh-CN" b="1" dirty="0" smtClean="0"/>
+              <a:t>the column</a:t>
+            </a:r>
+            <a:r>
+              <a:rPr lang="zh-CN" altLang="en-US" b="1" dirty="0" smtClean="0"/>
+              <a:t> </a:t>
+            </a:r>
+            <a:r>
+              <a:rPr lang="en-US" altLang="zh-CN" b="1" dirty="0" smtClean="0"/>
+              <a:t>weight(sum)</a:t>
+            </a:r>
+            <a:r>
+              <a:rPr lang="zh-CN" altLang="en-US" b="1" dirty="0" smtClean="0"/>
+              <a:t> </a:t>
+            </a:r>
+            <a:r>
+              <a:rPr lang="en-US" altLang="zh-CN" b="1" dirty="0" smtClean="0"/>
+              <a:t>to</a:t>
+            </a:r>
+            <a:r>
+              <a:rPr lang="zh-CN" altLang="en-US" b="1" dirty="0" smtClean="0"/>
+              <a:t> </a:t>
+            </a:r>
+            <a:r>
+              <a:rPr lang="en-US" altLang="zh-CN" b="1" dirty="0" smtClean="0"/>
+              <a:t>do</a:t>
+            </a:r>
+            <a:r>
+              <a:rPr lang="zh-CN" altLang="en-US" b="1" dirty="0" smtClean="0"/>
+              <a:t> </a:t>
+            </a:r>
+            <a:r>
+              <a:rPr lang="en-US" altLang="zh-CN" b="1" dirty="0" smtClean="0"/>
+              <a:t>horizontal</a:t>
+            </a:r>
+            <a:r>
+              <a:rPr lang="zh-CN" altLang="en-US" b="1" dirty="0" smtClean="0"/>
+              <a:t> </a:t>
+            </a:r>
+            <a:r>
+              <a:rPr lang="en-US" altLang="zh-CN" b="1" dirty="0" smtClean="0"/>
+              <a:t>segmentation</a:t>
+            </a:r>
+            <a:endParaRPr lang="en-US" altLang="zh-CN" b="1" dirty="0"/>
+          </a:p>
+          <a:p>
+            <a:pPr>
+              <a:buFont typeface="Wingdings" charset="2"/>
+              <a:buChar char="q"/>
+            </a:pPr>
+            <a:r>
+              <a:rPr lang="zh-CN" altLang="en-US" b="1" dirty="0"/>
+              <a:t> </a:t>
+            </a:r>
+            <a:r>
+              <a:rPr lang="en-US" altLang="zh-CN" dirty="0" smtClean="0"/>
+              <a:t>Large color difference(black and white) between character and the space in the middle of the two characters</a:t>
+            </a:r>
+            <a:endParaRPr lang="en-US" altLang="zh-CN" dirty="0"/>
+          </a:p>
+          <a:p>
+            <a:r>
+              <a:rPr lang="en-US" altLang="zh-CN" b="1" dirty="0" smtClean="0"/>
+              <a:t>Calculate</a:t>
+            </a:r>
+            <a:r>
+              <a:rPr lang="zh-CN" altLang="en-US" b="1" dirty="0" smtClean="0"/>
+              <a:t> </a:t>
+            </a:r>
+            <a:r>
+              <a:rPr lang="en-US" altLang="zh-CN" b="1" dirty="0" smtClean="0"/>
+              <a:t>the row weight(sum) to do vertical segmentation </a:t>
+            </a:r>
+          </a:p>
+          <a:p>
+            <a:pPr>
+              <a:buFont typeface="Wingdings" charset="2"/>
+              <a:buChar char="q"/>
+            </a:pPr>
+            <a:r>
+              <a:rPr lang="zh-CN" altLang="en-US" b="1" dirty="0"/>
+              <a:t> </a:t>
+            </a:r>
+            <a:r>
+              <a:rPr lang="en-US" altLang="zh-CN" dirty="0" smtClean="0"/>
+              <a:t>Set the top and bottom boundaries for each character </a:t>
+            </a:r>
+            <a:endParaRPr lang="en-US" altLang="zh-CN" b="1" dirty="0" smtClean="0"/>
+          </a:p>
+          <a:p>
+            <a:r>
+              <a:rPr lang="en-US" altLang="zh-CN" b="1" dirty="0" smtClean="0"/>
+              <a:t>Use the character feature to further remove the noise </a:t>
+            </a:r>
+          </a:p>
+          <a:p>
+            <a:pPr>
+              <a:buFont typeface="Wingdings" charset="2"/>
+              <a:buChar char="q"/>
+            </a:pPr>
+            <a:r>
+              <a:rPr lang="zh-CN" altLang="en-US" b="1" dirty="0"/>
+              <a:t> </a:t>
+            </a:r>
+            <a:r>
+              <a:rPr lang="en-US" altLang="zh-CN" dirty="0" smtClean="0"/>
+              <a:t>The ratio of row to column sits in a specific range (0.5 </a:t>
+            </a:r>
+            <a:r>
+              <a:rPr lang="mr-IN" altLang="zh-CN" dirty="0" smtClean="0"/>
+              <a:t>–</a:t>
+            </a:r>
+            <a:r>
+              <a:rPr lang="en-US" altLang="zh-CN" dirty="0" smtClean="0"/>
+              <a:t> 2.0)</a:t>
+            </a:r>
+            <a:endParaRPr lang="en-US" altLang="zh-CN" dirty="0"/>
+          </a:p>
+          <a:p>
+            <a:pPr>
+              <a:buFont typeface="Wingdings" charset="2"/>
+              <a:buChar char="q"/>
+            </a:pPr>
+            <a:r>
+              <a:rPr lang="zh-CN" altLang="en-US" b="1" dirty="0"/>
+              <a:t> </a:t>
+            </a:r>
+            <a:r>
+              <a:rPr lang="en-US" altLang="zh-CN" dirty="0" smtClean="0"/>
+              <a:t>The ratio of the sum of character matrix to its (row * column) is greater than some threshold value( &gt; 0.1)</a:t>
+            </a:r>
+            <a:endParaRPr lang="en-US" altLang="zh-CN" b="1" dirty="0"/>
+          </a:p>
+          <a:p>
+            <a:endParaRPr lang="en-US" altLang="zh-CN" b="1" dirty="0"/>
           </a:p>
         </p:txBody>
       </p:sp>

</xml_diff>